<commit_message>
Add hypothetical backtested performance disclosure
Add hypothetical backtested performance verbiage to repository
disclosure.
</commit_message>
<xml_diff>
--- a/Quantopian Overview - 2017.07.20/Quantopian Overview.pptx
+++ b/Quantopian Overview - 2017.07.20/Quantopian Overview.pptx
@@ -129,6 +129,22 @@
       </a:defRPr>
     </a:lvl9pPr>
   </p:defaultTextStyle>
+  <p:extLst>
+    <p:ext uri="{EFAFB233-063F-42B5-8137-9DF3F51BA10A}">
+      <p15:sldGuideLst xmlns:p15="http://schemas.microsoft.com/office/powerpoint/2012/main">
+        <p15:guide id="1" orient="horz" pos="2160">
+          <p15:clr>
+            <a:srgbClr val="A4A3A4"/>
+          </p15:clr>
+        </p15:guide>
+        <p15:guide id="2" pos="2880">
+          <p15:clr>
+            <a:srgbClr val="A4A3A4"/>
+          </p15:clr>
+        </p15:guide>
+      </p15:sldGuideLst>
+    </p:ext>
+  </p:extLst>
 </p:presentation>
 </file>
 
@@ -215,7 +231,7 @@
             <a:fld id="{67241C7E-A8FC-4727-A8FD-0BBC4F95205C}" type="datetimeFigureOut">
               <a:rPr lang="en-US" smtClean="0"/>
               <a:pPr/>
-              <a:t>7/19/2017</a:t>
+              <a:t>7/20/2017</a:t>
             </a:fld>
             <a:endParaRPr lang="en-US"/>
           </a:p>
@@ -384,7 +400,7 @@
     </p:spTree>
     <p:extLst>
       <p:ext uri="{BB962C8B-B14F-4D97-AF65-F5344CB8AC3E}">
-        <p14:creationId xmlns:p14="http://schemas.microsoft.com/office/powerpoint/2010/main" xmlns="" val="2293644568"/>
+        <p14:creationId xmlns:p14="http://schemas.microsoft.com/office/powerpoint/2010/main" val="2293644568"/>
       </p:ext>
     </p:extLst>
   </p:cSld>
@@ -662,6 +678,11 @@
         </p:txBody>
       </p:sp>
     </p:spTree>
+    <p:extLst>
+      <p:ext uri="{BB962C8B-B14F-4D97-AF65-F5344CB8AC3E}">
+        <p14:creationId xmlns:p14="http://schemas.microsoft.com/office/powerpoint/2010/main" val="1264875792"/>
+      </p:ext>
+    </p:extLst>
   </p:cSld>
   <p:clrMapOvr>
     <a:masterClrMapping/>
@@ -827,7 +848,7 @@
     </p:spTree>
     <p:extLst>
       <p:ext uri="{BB962C8B-B14F-4D97-AF65-F5344CB8AC3E}">
-        <p14:creationId xmlns:p14="http://schemas.microsoft.com/office/powerpoint/2010/main" xmlns="" val="2622620580"/>
+        <p14:creationId xmlns:p14="http://schemas.microsoft.com/office/powerpoint/2010/main" val="2622620580"/>
       </p:ext>
     </p:extLst>
   </p:cSld>
@@ -912,7 +933,7 @@
     </p:spTree>
     <p:extLst>
       <p:ext uri="{BB962C8B-B14F-4D97-AF65-F5344CB8AC3E}">
-        <p14:creationId xmlns:p14="http://schemas.microsoft.com/office/powerpoint/2010/main" xmlns="" val="187639633"/>
+        <p14:creationId xmlns:p14="http://schemas.microsoft.com/office/powerpoint/2010/main" val="187639633"/>
       </p:ext>
     </p:extLst>
   </p:cSld>
@@ -997,7 +1018,7 @@
     </p:spTree>
     <p:extLst>
       <p:ext uri="{BB962C8B-B14F-4D97-AF65-F5344CB8AC3E}">
-        <p14:creationId xmlns:p14="http://schemas.microsoft.com/office/powerpoint/2010/main" xmlns="" val="187639633"/>
+        <p14:creationId xmlns:p14="http://schemas.microsoft.com/office/powerpoint/2010/main" val="187639633"/>
       </p:ext>
     </p:extLst>
   </p:cSld>
@@ -1210,6 +1231,11 @@
         </p:txBody>
       </p:sp>
     </p:spTree>
+    <p:extLst>
+      <p:ext uri="{BB962C8B-B14F-4D97-AF65-F5344CB8AC3E}">
+        <p14:creationId xmlns:p14="http://schemas.microsoft.com/office/powerpoint/2010/main" val="248994022"/>
+      </p:ext>
+    </p:extLst>
   </p:cSld>
   <p:clrMapOvr>
     <a:masterClrMapping/>
@@ -1292,7 +1318,7 @@
     </p:spTree>
     <p:extLst>
       <p:ext uri="{BB962C8B-B14F-4D97-AF65-F5344CB8AC3E}">
-        <p14:creationId xmlns:p14="http://schemas.microsoft.com/office/powerpoint/2010/main" xmlns="" val="187639633"/>
+        <p14:creationId xmlns:p14="http://schemas.microsoft.com/office/powerpoint/2010/main" val="187639633"/>
       </p:ext>
     </p:extLst>
   </p:cSld>
@@ -1380,6 +1406,11 @@
         </p:txBody>
       </p:sp>
     </p:spTree>
+    <p:extLst>
+      <p:ext uri="{BB962C8B-B14F-4D97-AF65-F5344CB8AC3E}">
+        <p14:creationId xmlns:p14="http://schemas.microsoft.com/office/powerpoint/2010/main" val="2350760123"/>
+      </p:ext>
+    </p:extLst>
   </p:cSld>
   <p:clrMapOvr>
     <a:masterClrMapping/>
@@ -1462,7 +1493,7 @@
     </p:spTree>
     <p:extLst>
       <p:ext uri="{BB962C8B-B14F-4D97-AF65-F5344CB8AC3E}">
-        <p14:creationId xmlns:p14="http://schemas.microsoft.com/office/powerpoint/2010/main" xmlns="" val="1629916668"/>
+        <p14:creationId xmlns:p14="http://schemas.microsoft.com/office/powerpoint/2010/main" val="1629916668"/>
       </p:ext>
     </p:extLst>
   </p:cSld>
@@ -1547,7 +1578,7 @@
     </p:spTree>
     <p:extLst>
       <p:ext uri="{BB962C8B-B14F-4D97-AF65-F5344CB8AC3E}">
-        <p14:creationId xmlns:p14="http://schemas.microsoft.com/office/powerpoint/2010/main" xmlns="" val="187639633"/>
+        <p14:creationId xmlns:p14="http://schemas.microsoft.com/office/powerpoint/2010/main" val="187639633"/>
       </p:ext>
     </p:extLst>
   </p:cSld>
@@ -1632,7 +1663,7 @@
     </p:spTree>
     <p:extLst>
       <p:ext uri="{BB962C8B-B14F-4D97-AF65-F5344CB8AC3E}">
-        <p14:creationId xmlns:p14="http://schemas.microsoft.com/office/powerpoint/2010/main" xmlns="" val="187639633"/>
+        <p14:creationId xmlns:p14="http://schemas.microsoft.com/office/powerpoint/2010/main" val="187639633"/>
       </p:ext>
     </p:extLst>
   </p:cSld>
@@ -1725,7 +1756,7 @@
     </p:spTree>
     <p:extLst>
       <p:ext uri="{BB962C8B-B14F-4D97-AF65-F5344CB8AC3E}">
-        <p14:creationId xmlns:p14="http://schemas.microsoft.com/office/powerpoint/2010/main" xmlns="" val="30895318"/>
+        <p14:creationId xmlns:p14="http://schemas.microsoft.com/office/powerpoint/2010/main" val="30895318"/>
       </p:ext>
     </p:extLst>
   </p:cSld>
@@ -1810,7 +1841,7 @@
     </p:spTree>
     <p:extLst>
       <p:ext uri="{BB962C8B-B14F-4D97-AF65-F5344CB8AC3E}">
-        <p14:creationId xmlns:p14="http://schemas.microsoft.com/office/powerpoint/2010/main" xmlns="" val="187639633"/>
+        <p14:creationId xmlns:p14="http://schemas.microsoft.com/office/powerpoint/2010/main" val="187639633"/>
       </p:ext>
     </p:extLst>
   </p:cSld>
@@ -1943,6 +1974,11 @@
         </p:txBody>
       </p:sp>
     </p:spTree>
+    <p:extLst>
+      <p:ext uri="{BB962C8B-B14F-4D97-AF65-F5344CB8AC3E}">
+        <p14:creationId xmlns:p14="http://schemas.microsoft.com/office/powerpoint/2010/main" val="504516676"/>
+      </p:ext>
+    </p:extLst>
   </p:cSld>
   <p:clrMapOvr>
     <a:masterClrMapping/>
@@ -2025,7 +2061,7 @@
     </p:spTree>
     <p:extLst>
       <p:ext uri="{BB962C8B-B14F-4D97-AF65-F5344CB8AC3E}">
-        <p14:creationId xmlns:p14="http://schemas.microsoft.com/office/powerpoint/2010/main" xmlns="" val="187639633"/>
+        <p14:creationId xmlns:p14="http://schemas.microsoft.com/office/powerpoint/2010/main" val="187639633"/>
       </p:ext>
     </p:extLst>
   </p:cSld>
@@ -2295,7 +2331,7 @@
     </p:spTree>
     <p:extLst>
       <p:ext uri="{BB962C8B-B14F-4D97-AF65-F5344CB8AC3E}">
-        <p14:creationId xmlns:p14="http://schemas.microsoft.com/office/powerpoint/2010/main" xmlns="" val="190513395"/>
+        <p14:creationId xmlns:p14="http://schemas.microsoft.com/office/powerpoint/2010/main" val="190513395"/>
       </p:ext>
     </p:extLst>
   </p:cSld>
@@ -2466,7 +2502,7 @@
     </p:spTree>
     <p:extLst>
       <p:ext uri="{BB962C8B-B14F-4D97-AF65-F5344CB8AC3E}">
-        <p14:creationId xmlns:p14="http://schemas.microsoft.com/office/powerpoint/2010/main" xmlns="" val="2745974195"/>
+        <p14:creationId xmlns:p14="http://schemas.microsoft.com/office/powerpoint/2010/main" val="2745974195"/>
       </p:ext>
     </p:extLst>
   </p:cSld>
@@ -2647,7 +2683,7 @@
     </p:spTree>
     <p:extLst>
       <p:ext uri="{BB962C8B-B14F-4D97-AF65-F5344CB8AC3E}">
-        <p14:creationId xmlns:p14="http://schemas.microsoft.com/office/powerpoint/2010/main" xmlns="" val="1128885531"/>
+        <p14:creationId xmlns:p14="http://schemas.microsoft.com/office/powerpoint/2010/main" val="1128885531"/>
       </p:ext>
     </p:extLst>
   </p:cSld>
@@ -2827,7 +2863,7 @@
     </p:spTree>
     <p:extLst>
       <p:ext uri="{BB962C8B-B14F-4D97-AF65-F5344CB8AC3E}">
-        <p14:creationId xmlns:p14="http://schemas.microsoft.com/office/powerpoint/2010/main" xmlns="" val="3271901914"/>
+        <p14:creationId xmlns:p14="http://schemas.microsoft.com/office/powerpoint/2010/main" val="3271901914"/>
       </p:ext>
     </p:extLst>
   </p:cSld>
@@ -3074,7 +3110,7 @@
     </p:spTree>
     <p:extLst>
       <p:ext uri="{BB962C8B-B14F-4D97-AF65-F5344CB8AC3E}">
-        <p14:creationId xmlns:p14="http://schemas.microsoft.com/office/powerpoint/2010/main" xmlns="" val="2828897387"/>
+        <p14:creationId xmlns:p14="http://schemas.microsoft.com/office/powerpoint/2010/main" val="2828897387"/>
       </p:ext>
     </p:extLst>
   </p:cSld>
@@ -3363,7 +3399,7 @@
     </p:spTree>
     <p:extLst>
       <p:ext uri="{BB962C8B-B14F-4D97-AF65-F5344CB8AC3E}">
-        <p14:creationId xmlns:p14="http://schemas.microsoft.com/office/powerpoint/2010/main" xmlns="" val="2717212472"/>
+        <p14:creationId xmlns:p14="http://schemas.microsoft.com/office/powerpoint/2010/main" val="2717212472"/>
       </p:ext>
     </p:extLst>
   </p:cSld>
@@ -3786,7 +3822,7 @@
     </p:spTree>
     <p:extLst>
       <p:ext uri="{BB962C8B-B14F-4D97-AF65-F5344CB8AC3E}">
-        <p14:creationId xmlns:p14="http://schemas.microsoft.com/office/powerpoint/2010/main" xmlns="" val="2941882986"/>
+        <p14:creationId xmlns:p14="http://schemas.microsoft.com/office/powerpoint/2010/main" val="2941882986"/>
       </p:ext>
     </p:extLst>
   </p:cSld>
@@ -3905,7 +3941,7 @@
     </p:spTree>
     <p:extLst>
       <p:ext uri="{BB962C8B-B14F-4D97-AF65-F5344CB8AC3E}">
-        <p14:creationId xmlns:p14="http://schemas.microsoft.com/office/powerpoint/2010/main" xmlns="" val="2329098773"/>
+        <p14:creationId xmlns:p14="http://schemas.microsoft.com/office/powerpoint/2010/main" val="2329098773"/>
       </p:ext>
     </p:extLst>
   </p:cSld>
@@ -4001,7 +4037,7 @@
     </p:spTree>
     <p:extLst>
       <p:ext uri="{BB962C8B-B14F-4D97-AF65-F5344CB8AC3E}">
-        <p14:creationId xmlns:p14="http://schemas.microsoft.com/office/powerpoint/2010/main" xmlns="" val="2780930156"/>
+        <p14:creationId xmlns:p14="http://schemas.microsoft.com/office/powerpoint/2010/main" val="2780930156"/>
       </p:ext>
     </p:extLst>
   </p:cSld>
@@ -4279,7 +4315,7 @@
     </p:spTree>
     <p:extLst>
       <p:ext uri="{BB962C8B-B14F-4D97-AF65-F5344CB8AC3E}">
-        <p14:creationId xmlns:p14="http://schemas.microsoft.com/office/powerpoint/2010/main" xmlns="" val="627725857"/>
+        <p14:creationId xmlns:p14="http://schemas.microsoft.com/office/powerpoint/2010/main" val="627725857"/>
       </p:ext>
     </p:extLst>
   </p:cSld>
@@ -4533,7 +4569,7 @@
     </p:spTree>
     <p:extLst>
       <p:ext uri="{BB962C8B-B14F-4D97-AF65-F5344CB8AC3E}">
-        <p14:creationId xmlns:p14="http://schemas.microsoft.com/office/powerpoint/2010/main" xmlns="" val="4002536108"/>
+        <p14:creationId xmlns:p14="http://schemas.microsoft.com/office/powerpoint/2010/main" val="4002536108"/>
       </p:ext>
     </p:extLst>
   </p:cSld>
@@ -4781,7 +4817,7 @@
     </p:spTree>
     <p:extLst>
       <p:ext uri="{BB962C8B-B14F-4D97-AF65-F5344CB8AC3E}">
-        <p14:creationId xmlns:p14="http://schemas.microsoft.com/office/powerpoint/2010/main" xmlns="" val="3424924429"/>
+        <p14:creationId xmlns:p14="http://schemas.microsoft.com/office/powerpoint/2010/main" val="3424924429"/>
       </p:ext>
     </p:extLst>
   </p:cSld>
@@ -5187,13 +5223,20 @@
     </p:spTree>
     <p:extLst>
       <p:ext uri="{BB962C8B-B14F-4D97-AF65-F5344CB8AC3E}">
-        <p14:creationId xmlns:p14="http://schemas.microsoft.com/office/powerpoint/2010/main" xmlns="" val="3752773742"/>
+        <p14:creationId xmlns:p14="http://schemas.microsoft.com/office/powerpoint/2010/main" val="3752773742"/>
       </p:ext>
     </p:extLst>
   </p:cSld>
   <p:clrMapOvr>
     <a:masterClrMapping/>
   </p:clrMapOvr>
+  <p:timing>
+    <p:tnLst>
+      <p:par>
+        <p:cTn id="1" dur="indefinite" restart="never" nodeType="tmRoot"/>
+      </p:par>
+    </p:tnLst>
+  </p:timing>
 </p:sld>
 </file>
 
@@ -5344,7 +5387,7 @@
     </p:spTree>
     <p:extLst>
       <p:ext uri="{BB962C8B-B14F-4D97-AF65-F5344CB8AC3E}">
-        <p14:creationId xmlns:p14="http://schemas.microsoft.com/office/powerpoint/2010/main" xmlns="" val="1648706516"/>
+        <p14:creationId xmlns:p14="http://schemas.microsoft.com/office/powerpoint/2010/main" val="1648706516"/>
       </p:ext>
     </p:extLst>
   </p:cSld>
@@ -5590,7 +5633,7 @@
     </p:spTree>
     <p:extLst>
       <p:ext uri="{BB962C8B-B14F-4D97-AF65-F5344CB8AC3E}">
-        <p14:creationId xmlns:p14="http://schemas.microsoft.com/office/powerpoint/2010/main" xmlns="" val="116008342"/>
+        <p14:creationId xmlns:p14="http://schemas.microsoft.com/office/powerpoint/2010/main" val="116008342"/>
       </p:ext>
     </p:extLst>
   </p:cSld>
@@ -5789,7 +5832,7 @@
     </p:spTree>
     <p:extLst>
       <p:ext uri="{BB962C8B-B14F-4D97-AF65-F5344CB8AC3E}">
-        <p14:creationId xmlns:p14="http://schemas.microsoft.com/office/powerpoint/2010/main" xmlns="" val="1285358647"/>
+        <p14:creationId xmlns:p14="http://schemas.microsoft.com/office/powerpoint/2010/main" val="1285358647"/>
       </p:ext>
     </p:extLst>
   </p:cSld>
@@ -6035,7 +6078,7 @@
     </p:spTree>
     <p:extLst>
       <p:ext uri="{BB962C8B-B14F-4D97-AF65-F5344CB8AC3E}">
-        <p14:creationId xmlns:p14="http://schemas.microsoft.com/office/powerpoint/2010/main" xmlns="" val="116008342"/>
+        <p14:creationId xmlns:p14="http://schemas.microsoft.com/office/powerpoint/2010/main" val="116008342"/>
       </p:ext>
     </p:extLst>
   </p:cSld>
@@ -6200,7 +6243,7 @@
     </p:spTree>
     <p:extLst>
       <p:ext uri="{BB962C8B-B14F-4D97-AF65-F5344CB8AC3E}">
-        <p14:creationId xmlns:p14="http://schemas.microsoft.com/office/powerpoint/2010/main" xmlns="" val="2316972064"/>
+        <p14:creationId xmlns:p14="http://schemas.microsoft.com/office/powerpoint/2010/main" val="2316972064"/>
       </p:ext>
     </p:extLst>
   </p:cSld>
@@ -6446,7 +6489,7 @@
     </p:spTree>
     <p:extLst>
       <p:ext uri="{BB962C8B-B14F-4D97-AF65-F5344CB8AC3E}">
-        <p14:creationId xmlns:p14="http://schemas.microsoft.com/office/powerpoint/2010/main" xmlns="" val="116008342"/>
+        <p14:creationId xmlns:p14="http://schemas.microsoft.com/office/powerpoint/2010/main" val="116008342"/>
       </p:ext>
     </p:extLst>
   </p:cSld>
@@ -6606,7 +6649,7 @@
     </p:spTree>
     <p:extLst>
       <p:ext uri="{BB962C8B-B14F-4D97-AF65-F5344CB8AC3E}">
-        <p14:creationId xmlns:p14="http://schemas.microsoft.com/office/powerpoint/2010/main" xmlns="" val="205842524"/>
+        <p14:creationId xmlns:p14="http://schemas.microsoft.com/office/powerpoint/2010/main" val="205842524"/>
       </p:ext>
     </p:extLst>
   </p:cSld>
@@ -6852,7 +6895,7 @@
     </p:spTree>
     <p:extLst>
       <p:ext uri="{BB962C8B-B14F-4D97-AF65-F5344CB8AC3E}">
-        <p14:creationId xmlns:p14="http://schemas.microsoft.com/office/powerpoint/2010/main" xmlns="" val="116008342"/>
+        <p14:creationId xmlns:p14="http://schemas.microsoft.com/office/powerpoint/2010/main" val="116008342"/>
       </p:ext>
     </p:extLst>
   </p:cSld>
@@ -7023,7 +7066,7 @@
     </p:spTree>
     <p:extLst>
       <p:ext uri="{BB962C8B-B14F-4D97-AF65-F5344CB8AC3E}">
-        <p14:creationId xmlns:p14="http://schemas.microsoft.com/office/powerpoint/2010/main" xmlns="" val="4008351309"/>
+        <p14:creationId xmlns:p14="http://schemas.microsoft.com/office/powerpoint/2010/main" val="4008351309"/>
       </p:ext>
     </p:extLst>
   </p:cSld>
@@ -7263,7 +7306,7 @@
     </p:spTree>
     <p:extLst>
       <p:ext uri="{BB962C8B-B14F-4D97-AF65-F5344CB8AC3E}">
-        <p14:creationId xmlns:p14="http://schemas.microsoft.com/office/powerpoint/2010/main" xmlns="" val="116008342"/>
+        <p14:creationId xmlns:p14="http://schemas.microsoft.com/office/powerpoint/2010/main" val="116008342"/>
       </p:ext>
     </p:extLst>
   </p:cSld>
@@ -7347,11 +7390,7 @@
           <a:p>
             <a:r>
               <a:rPr lang="en-US" dirty="0" smtClean="0"/>
-              <a:t>Bring together intelligent people who have a passion for quantitative finance </a:t>
-            </a:r>
-            <a:r>
-              <a:rPr lang="en-US" dirty="0" smtClean="0"/>
-              <a:t>and see what happens.</a:t>
+              <a:t>Bring together intelligent people who have a passion for quantitative finance and see what happens.</a:t>
             </a:r>
           </a:p>
           <a:p>
@@ -7408,13 +7447,20 @@
     </p:spTree>
     <p:extLst>
       <p:ext uri="{BB962C8B-B14F-4D97-AF65-F5344CB8AC3E}">
-        <p14:creationId xmlns:p14="http://schemas.microsoft.com/office/powerpoint/2010/main" xmlns="" val="417784133"/>
+        <p14:creationId xmlns:p14="http://schemas.microsoft.com/office/powerpoint/2010/main" val="417784133"/>
       </p:ext>
     </p:extLst>
   </p:cSld>
   <p:clrMapOvr>
     <a:masterClrMapping/>
   </p:clrMapOvr>
+  <p:timing>
+    <p:tnLst>
+      <p:par>
+        <p:cTn id="1" dur="indefinite" restart="never" nodeType="tmRoot"/>
+      </p:par>
+    </p:tnLst>
+  </p:timing>
 </p:sld>
 </file>
 
@@ -7624,7 +7670,7 @@
     </p:spTree>
     <p:extLst>
       <p:ext uri="{BB962C8B-B14F-4D97-AF65-F5344CB8AC3E}">
-        <p14:creationId xmlns:p14="http://schemas.microsoft.com/office/powerpoint/2010/main" xmlns="" val="3666272655"/>
+        <p14:creationId xmlns:p14="http://schemas.microsoft.com/office/powerpoint/2010/main" val="3666272655"/>
       </p:ext>
     </p:extLst>
   </p:cSld>
@@ -7718,13 +7764,7 @@
               <a:rPr lang="en-US" dirty="0" smtClean="0">
                 <a:hlinkClick r:id="rId3"/>
               </a:rPr>
-              <a:t>https://gist.github.com</a:t>
-            </a:r>
-            <a:r>
-              <a:rPr lang="en-US" dirty="0" smtClean="0">
-                <a:hlinkClick r:id="rId3"/>
-              </a:rPr>
-              <a:t>/</a:t>
+              <a:t>https://gist.github.com/</a:t>
             </a:r>
             <a:endParaRPr lang="en-US" dirty="0" smtClean="0"/>
           </a:p>
@@ -7741,19 +7781,7 @@
               <a:rPr lang="en-US" dirty="0" smtClean="0">
                 <a:hlinkClick r:id="rId4"/>
               </a:rPr>
-              <a:t>http</a:t>
-            </a:r>
-            <a:r>
-              <a:rPr lang="en-US" dirty="0" smtClean="0">
-                <a:hlinkClick r:id="rId4"/>
-              </a:rPr>
-              <a:t>://www.gistboxapp.com</a:t>
-            </a:r>
-            <a:r>
-              <a:rPr lang="en-US" dirty="0" smtClean="0">
-                <a:hlinkClick r:id="rId4"/>
-              </a:rPr>
-              <a:t>/</a:t>
+              <a:t>http://www.gistboxapp.com/</a:t>
             </a:r>
             <a:endParaRPr lang="en-US" dirty="0" smtClean="0"/>
           </a:p>
@@ -7920,13 +7948,7 @@
               <a:rPr lang="en-US" dirty="0" smtClean="0">
                 <a:hlinkClick r:id="rId3"/>
               </a:rPr>
-              <a:t>https://</a:t>
-            </a:r>
-            <a:r>
-              <a:rPr lang="en-US" dirty="0" smtClean="0">
-                <a:hlinkClick r:id="rId3"/>
-              </a:rPr>
-              <a:t>github.com/MichaelJMath</a:t>
+              <a:t>https://github.com/MichaelJMath</a:t>
             </a:r>
             <a:endParaRPr lang="en-US" dirty="0" smtClean="0"/>
           </a:p>
@@ -7951,13 +7973,7 @@
               <a:rPr lang="en-US" dirty="0" smtClean="0">
                 <a:hlinkClick r:id="rId4"/>
               </a:rPr>
-              <a:t>https://</a:t>
-            </a:r>
-            <a:r>
-              <a:rPr lang="en-US" dirty="0" smtClean="0">
-                <a:hlinkClick r:id="rId4"/>
-              </a:rPr>
-              <a:t>gist.github.com/MichaelJMath</a:t>
+              <a:t>https://gist.github.com/MichaelJMath</a:t>
             </a:r>
             <a:endParaRPr lang="en-US" dirty="0" smtClean="0"/>
           </a:p>
@@ -8105,39 +8121,7 @@
           <a:p>
             <a:r>
               <a:rPr lang="en-US" dirty="0" smtClean="0"/>
-              <a:t>This presentation is </a:t>
-            </a:r>
-            <a:r>
-              <a:rPr lang="en-US" dirty="0" smtClean="0"/>
-              <a:t>for educational purposes only and is not intended to be used as a primary basis of an investment decision, nor should it be construed as advice or a recommendation designed to meet particular investment needs of any investor. </a:t>
-            </a:r>
-            <a:r>
-              <a:rPr lang="en-US" dirty="0" smtClean="0"/>
-              <a:t>The presenter </a:t>
-            </a:r>
-            <a:r>
-              <a:rPr lang="en-US" dirty="0" smtClean="0"/>
-              <a:t>has not considered any individual’s specific investment objective or financial situation in connection with this </a:t>
-            </a:r>
-            <a:r>
-              <a:rPr lang="en-US" dirty="0" smtClean="0"/>
-              <a:t>presentation, and </a:t>
-            </a:r>
-            <a:r>
-              <a:rPr lang="en-US" dirty="0" smtClean="0"/>
-              <a:t>no one should construe this </a:t>
-            </a:r>
-            <a:r>
-              <a:rPr lang="en-US" dirty="0" smtClean="0"/>
-              <a:t>presentation as </a:t>
-            </a:r>
-            <a:r>
-              <a:rPr lang="en-US" dirty="0" smtClean="0"/>
-              <a:t>a specific individualized recommendation to them. Before investing you should make your own independent evaluation of the investment based on your own circumstances. </a:t>
-            </a:r>
-            <a:r>
-              <a:rPr lang="en-US" dirty="0" smtClean="0"/>
-              <a:t>Any opinions or views expressed are that of the presenter and do not reflect the views of his current employer, Financial Trust Asset Management (FTAM). The presenter has no affiliation with </a:t>
+              <a:t>This presentation is for educational purposes only and is not intended to be used as a primary basis of an investment decision, nor should it be construed as advice or a recommendation designed to meet particular investment needs of any investor. The presenter has not considered any individual’s specific investment objective or financial situation in connection with this presentation, and no one should construe this presentation as a specific individualized recommendation to them. Before investing you should make your own independent evaluation of the investment based on your own circumstances. Any opinions or views expressed are that of the presenter and do not reflect the views of his current employer, Financial Trust Asset Management (FTAM). The presenter has no affiliation with </a:t>
             </a:r>
             <a:r>
               <a:rPr lang="en-US" dirty="0" err="1" smtClean="0"/>
@@ -8204,6 +8188,13 @@
   <p:clrMapOvr>
     <a:masterClrMapping/>
   </p:clrMapOvr>
+  <p:timing>
+    <p:tnLst>
+      <p:par>
+        <p:cTn id="1" dur="indefinite" restart="never" nodeType="tmRoot"/>
+      </p:par>
+    </p:tnLst>
+  </p:timing>
 </p:sld>
 </file>
 
@@ -8350,7 +8341,7 @@
     </p:spTree>
     <p:extLst>
       <p:ext uri="{BB962C8B-B14F-4D97-AF65-F5344CB8AC3E}">
-        <p14:creationId xmlns:p14="http://schemas.microsoft.com/office/powerpoint/2010/main" xmlns="" val="417784133"/>
+        <p14:creationId xmlns:p14="http://schemas.microsoft.com/office/powerpoint/2010/main" val="417784133"/>
       </p:ext>
     </p:extLst>
   </p:cSld>
@@ -8459,11 +8450,7 @@
             </a:r>
             <a:r>
               <a:rPr lang="en-US" dirty="0" smtClean="0"/>
-              <a:t> </a:t>
-            </a:r>
-            <a:r>
-              <a:rPr lang="en-US" dirty="0" smtClean="0"/>
-              <a:t>Repository</a:t>
+              <a:t> Repository</a:t>
             </a:r>
           </a:p>
           <a:p>
@@ -8524,7 +8511,7 @@
     </p:spTree>
     <p:extLst>
       <p:ext uri="{BB962C8B-B14F-4D97-AF65-F5344CB8AC3E}">
-        <p14:creationId xmlns:p14="http://schemas.microsoft.com/office/powerpoint/2010/main" xmlns="" val="331295902"/>
+        <p14:creationId xmlns:p14="http://schemas.microsoft.com/office/powerpoint/2010/main" val="331295902"/>
       </p:ext>
     </p:extLst>
   </p:cSld>
@@ -8732,7 +8719,7 @@
     </p:spTree>
     <p:extLst>
       <p:ext uri="{BB962C8B-B14F-4D97-AF65-F5344CB8AC3E}">
-        <p14:creationId xmlns:p14="http://schemas.microsoft.com/office/powerpoint/2010/main" xmlns="" val="168013159"/>
+        <p14:creationId xmlns:p14="http://schemas.microsoft.com/office/powerpoint/2010/main" val="168013159"/>
       </p:ext>
     </p:extLst>
   </p:cSld>
@@ -8922,7 +8909,7 @@
     </p:spTree>
     <p:extLst>
       <p:ext uri="{BB962C8B-B14F-4D97-AF65-F5344CB8AC3E}">
-        <p14:creationId xmlns:p14="http://schemas.microsoft.com/office/powerpoint/2010/main" xmlns="" val="1127935667"/>
+        <p14:creationId xmlns:p14="http://schemas.microsoft.com/office/powerpoint/2010/main" val="1127935667"/>
       </p:ext>
     </p:extLst>
   </p:cSld>
@@ -9139,7 +9126,7 @@
     </p:spTree>
     <p:extLst>
       <p:ext uri="{BB962C8B-B14F-4D97-AF65-F5344CB8AC3E}">
-        <p14:creationId xmlns:p14="http://schemas.microsoft.com/office/powerpoint/2010/main" xmlns="" val="116008342"/>
+        <p14:creationId xmlns:p14="http://schemas.microsoft.com/office/powerpoint/2010/main" val="116008342"/>
       </p:ext>
     </p:extLst>
   </p:cSld>
@@ -9392,7 +9379,7 @@
     </p:spTree>
     <p:extLst>
       <p:ext uri="{BB962C8B-B14F-4D97-AF65-F5344CB8AC3E}">
-        <p14:creationId xmlns:p14="http://schemas.microsoft.com/office/powerpoint/2010/main" xmlns="" val="116008342"/>
+        <p14:creationId xmlns:p14="http://schemas.microsoft.com/office/powerpoint/2010/main" val="116008342"/>
       </p:ext>
     </p:extLst>
   </p:cSld>
@@ -9553,7 +9540,7 @@
     </p:spTree>
     <p:extLst>
       <p:ext uri="{BB962C8B-B14F-4D97-AF65-F5344CB8AC3E}">
-        <p14:creationId xmlns:p14="http://schemas.microsoft.com/office/powerpoint/2010/main" xmlns="" val="4266765752"/>
+        <p14:creationId xmlns:p14="http://schemas.microsoft.com/office/powerpoint/2010/main" val="4266765752"/>
       </p:ext>
     </p:extLst>
   </p:cSld>

</xml_diff>